<commit_message>
add btns to home
</commit_message>
<xml_diff>
--- a/src/assets/descriptions/Presentation1.pptx
+++ b/src/assets/descriptions/Presentation1.pptx
@@ -3536,44 +3536,6 @@
                 <a:latin typeface="Stencil" panose="040409050D0802020404" pitchFamily="82" charset="0"/>
               </a:rPr>
               <a:t>LIVE ONBOARD THE INTERNATIONAL SPACE STATION</a:t>
-            </a:r>
-          </a:p>
-        </p:txBody>
-      </p:sp>
-      <p:sp>
-        <p:nvSpPr>
-          <p:cNvPr id="3" name="TextBox 2">
-            <a:extLst>
-              <a:ext uri="{FF2B5EF4-FFF2-40B4-BE49-F238E27FC236}">
-                <a16:creationId xmlns:a16="http://schemas.microsoft.com/office/drawing/2014/main" id="{E07D9E0B-481D-4A6E-B309-D3BC1EFBA0D7}"/>
-              </a:ext>
-            </a:extLst>
-          </p:cNvPr>
-          <p:cNvSpPr txBox="1"/>
-          <p:nvPr/>
-        </p:nvSpPr>
-        <p:spPr>
-          <a:xfrm>
-            <a:off x="440053" y="5875419"/>
-            <a:ext cx="11003009" cy="830997"/>
-          </a:xfrm>
-          <a:prstGeom prst="rect">
-            <a:avLst/>
-          </a:prstGeom>
-          <a:noFill/>
-        </p:spPr>
-        <p:txBody>
-          <a:bodyPr wrap="square" rtlCol="0">
-            <a:spAutoFit/>
-          </a:bodyPr>
-          <a:lstStyle/>
-          <a:p>
-            <a:pPr algn="ctr"/>
-            <a:r>
-              <a:rPr lang="en-US" sz="4800" dirty="0">
-                <a:latin typeface="Stencil" panose="040409050D0802020404" pitchFamily="82" charset="0"/>
-              </a:rPr>
-              <a:t>CLICK TO LEARN MORE</a:t>
             </a:r>
           </a:p>
         </p:txBody>

</xml_diff>